<commit_message>
Finished map and adjusted style
</commit_message>
<xml_diff>
--- a/Slides/Labeled_Map.pptx
+++ b/Slides/Labeled_Map.pptx
@@ -104,6 +104,11 @@
       </a:defRPr>
     </a:lvl9pPr>
   </p:defaultTextStyle>
+  <p:extLst>
+    <p:ext uri="{EFAFB233-063F-42B5-8137-9DF3F51BA10A}">
+      <p15:sldGuideLst xmlns:p15="http://schemas.microsoft.com/office/powerpoint/2012/main"/>
+    </p:ext>
+  </p:extLst>
 </p:presentation>
 </file>
 
@@ -3323,10 +3328,10 @@
       </p:grpSpPr>
       <p:pic>
         <p:nvPicPr>
-          <p:cNvPr id="40" name="Picture 39">
-            <a:extLst>
-              <a:ext uri="{FF2B5EF4-FFF2-40B4-BE49-F238E27FC236}">
-                <a16:creationId xmlns:a16="http://schemas.microsoft.com/office/drawing/2014/main" id="{99877A82-8BB2-4E48-B4B0-A31F6C20257D}"/>
+          <p:cNvPr id="5" name="Picture 4">
+            <a:extLst>
+              <a:ext uri="{FF2B5EF4-FFF2-40B4-BE49-F238E27FC236}">
+                <a16:creationId xmlns:a16="http://schemas.microsoft.com/office/drawing/2014/main" id="{76ED9F56-5151-45D7-99B2-52FA9D9EC4A6}"/>
               </a:ext>
             </a:extLst>
           </p:cNvPr>
@@ -3343,8 +3348,8 @@
         </p:blipFill>
         <p:spPr>
           <a:xfrm>
-            <a:off x="-107833" y="517034"/>
-            <a:ext cx="12192000" cy="5760352"/>
+            <a:off x="0" y="548472"/>
+            <a:ext cx="12192000" cy="5761055"/>
           </a:xfrm>
           <a:prstGeom prst="rect">
             <a:avLst/>
@@ -3365,7 +3370,7 @@
         </p:nvSpPr>
         <p:spPr>
           <a:xfrm>
-            <a:off x="2103505" y="3137461"/>
+            <a:off x="2211338" y="3145176"/>
             <a:ext cx="190821" cy="138499"/>
           </a:xfrm>
           <a:prstGeom prst="rect">
@@ -3405,7 +3410,7 @@
         </p:nvSpPr>
         <p:spPr>
           <a:xfrm>
-            <a:off x="1373772" y="1830322"/>
+            <a:off x="1481605" y="1838037"/>
             <a:ext cx="245324" cy="138499"/>
           </a:xfrm>
           <a:prstGeom prst="rect">
@@ -3445,7 +3450,7 @@
         </p:nvSpPr>
         <p:spPr>
           <a:xfrm>
-            <a:off x="2948473" y="2726243"/>
+            <a:off x="3056306" y="2733958"/>
             <a:ext cx="203645" cy="138499"/>
           </a:xfrm>
           <a:prstGeom prst="rect">
@@ -3485,7 +3490,7 @@
         </p:nvSpPr>
         <p:spPr>
           <a:xfrm>
-            <a:off x="6182619" y="3068212"/>
+            <a:off x="6290452" y="3075927"/>
             <a:ext cx="237309" cy="138499"/>
           </a:xfrm>
           <a:prstGeom prst="rect">
@@ -3525,7 +3530,7 @@
         </p:nvSpPr>
         <p:spPr>
           <a:xfrm>
-            <a:off x="6020041" y="3351687"/>
+            <a:off x="6127874" y="3359402"/>
             <a:ext cx="232500" cy="138499"/>
           </a:xfrm>
           <a:prstGeom prst="rect">
@@ -3565,7 +3570,7 @@
         </p:nvSpPr>
         <p:spPr>
           <a:xfrm>
-            <a:off x="5876269" y="3026794"/>
+            <a:off x="5984102" y="3034509"/>
             <a:ext cx="230897" cy="138499"/>
           </a:xfrm>
           <a:prstGeom prst="rect">
@@ -3605,7 +3610,7 @@
         </p:nvSpPr>
         <p:spPr>
           <a:xfrm>
-            <a:off x="5351493" y="3184634"/>
+            <a:off x="5459326" y="3192349"/>
             <a:ext cx="211661" cy="138499"/>
           </a:xfrm>
           <a:prstGeom prst="rect">
@@ -3645,7 +3650,7 @@
         </p:nvSpPr>
         <p:spPr>
           <a:xfrm>
-            <a:off x="5613877" y="3538034"/>
+            <a:off x="5721710" y="3545749"/>
             <a:ext cx="242118" cy="138499"/>
           </a:xfrm>
           <a:prstGeom prst="rect">
@@ -3685,7 +3690,7 @@
         </p:nvSpPr>
         <p:spPr>
           <a:xfrm>
-            <a:off x="6857311" y="3645222"/>
+            <a:off x="6965144" y="3652937"/>
             <a:ext cx="270972" cy="138499"/>
           </a:xfrm>
           <a:prstGeom prst="rect">
@@ -3725,7 +3730,7 @@
         </p:nvSpPr>
         <p:spPr>
           <a:xfrm>
-            <a:off x="6906973" y="3875423"/>
+            <a:off x="7014806" y="3883138"/>
             <a:ext cx="246927" cy="138499"/>
           </a:xfrm>
           <a:prstGeom prst="rect">
@@ -3765,7 +3770,7 @@
         </p:nvSpPr>
         <p:spPr>
           <a:xfrm>
-            <a:off x="6902164" y="4087653"/>
+            <a:off x="7009997" y="4095368"/>
             <a:ext cx="251736" cy="138499"/>
           </a:xfrm>
           <a:prstGeom prst="rect">
@@ -3805,7 +3810,7 @@
         </p:nvSpPr>
         <p:spPr>
           <a:xfrm>
-            <a:off x="6808955" y="4263878"/>
+            <a:off x="6916788" y="4271593"/>
             <a:ext cx="253339" cy="138499"/>
           </a:xfrm>
           <a:prstGeom prst="rect">
@@ -3845,7 +3850,7 @@
         </p:nvSpPr>
         <p:spPr>
           <a:xfrm>
-            <a:off x="6140617" y="3922407"/>
+            <a:off x="6248450" y="3930122"/>
             <a:ext cx="198837" cy="138499"/>
           </a:xfrm>
           <a:prstGeom prst="rect">
@@ -3885,7 +3890,7 @@
         </p:nvSpPr>
         <p:spPr>
           <a:xfrm>
-            <a:off x="5710590" y="4351199"/>
+            <a:off x="5818423" y="4358914"/>
             <a:ext cx="208455" cy="138499"/>
           </a:xfrm>
           <a:prstGeom prst="rect">
@@ -3925,7 +3930,7 @@
         </p:nvSpPr>
         <p:spPr>
           <a:xfrm>
-            <a:off x="6262771" y="3720556"/>
+            <a:off x="6370604" y="3728271"/>
             <a:ext cx="237309" cy="138499"/>
           </a:xfrm>
           <a:prstGeom prst="rect">
@@ -3965,7 +3970,7 @@
         </p:nvSpPr>
         <p:spPr>
           <a:xfrm>
-            <a:off x="6357178" y="3517555"/>
+            <a:off x="6465011" y="3525270"/>
             <a:ext cx="234103" cy="138499"/>
           </a:xfrm>
           <a:prstGeom prst="rect">
@@ -4005,7 +4010,7 @@
         </p:nvSpPr>
         <p:spPr>
           <a:xfrm>
-            <a:off x="7873174" y="3068170"/>
+            <a:off x="7981007" y="3075885"/>
             <a:ext cx="173189" cy="138499"/>
           </a:xfrm>
           <a:prstGeom prst="rect">
@@ -4045,7 +4050,7 @@
         </p:nvSpPr>
         <p:spPr>
           <a:xfrm>
-            <a:off x="7861658" y="2850194"/>
+            <a:off x="7969491" y="2857909"/>
             <a:ext cx="218073" cy="138499"/>
           </a:xfrm>
           <a:prstGeom prst="rect">
@@ -4085,7 +4090,7 @@
         </p:nvSpPr>
         <p:spPr>
           <a:xfrm>
-            <a:off x="8015173" y="2451990"/>
+            <a:off x="8123006" y="2459705"/>
             <a:ext cx="250133" cy="138499"/>
           </a:xfrm>
           <a:prstGeom prst="rect">
@@ -4125,7 +4130,7 @@
         </p:nvSpPr>
         <p:spPr>
           <a:xfrm>
-            <a:off x="9521369" y="3238874"/>
+            <a:off x="9629202" y="3246589"/>
             <a:ext cx="301429" cy="138499"/>
           </a:xfrm>
           <a:prstGeom prst="rect">
@@ -4165,7 +4170,7 @@
         </p:nvSpPr>
         <p:spPr>
           <a:xfrm>
-            <a:off x="8786391" y="2392121"/>
+            <a:off x="8894224" y="2399836"/>
             <a:ext cx="226088" cy="138499"/>
           </a:xfrm>
           <a:prstGeom prst="rect">
@@ -4205,7 +4210,7 @@
         </p:nvSpPr>
         <p:spPr>
           <a:xfrm>
-            <a:off x="8185710" y="2047436"/>
+            <a:off x="8293543" y="2055151"/>
             <a:ext cx="237309" cy="138499"/>
           </a:xfrm>
           <a:prstGeom prst="rect">
@@ -4245,7 +4250,7 @@
         </p:nvSpPr>
         <p:spPr>
           <a:xfrm>
-            <a:off x="8395883" y="2673481"/>
+            <a:off x="8503716" y="2681196"/>
             <a:ext cx="198837" cy="138499"/>
           </a:xfrm>
           <a:prstGeom prst="rect">
@@ -4285,7 +4290,7 @@
         </p:nvSpPr>
         <p:spPr>
           <a:xfrm>
-            <a:off x="8626185" y="2864742"/>
+            <a:off x="8734018" y="2872457"/>
             <a:ext cx="181203" cy="138499"/>
           </a:xfrm>
           <a:prstGeom prst="rect">
@@ -4325,7 +4330,7 @@
         </p:nvSpPr>
         <p:spPr>
           <a:xfrm>
-            <a:off x="8475491" y="2322871"/>
+            <a:off x="8583324" y="2330586"/>
             <a:ext cx="203645" cy="138499"/>
           </a:xfrm>
           <a:prstGeom prst="rect">
@@ -4365,7 +4370,7 @@
         </p:nvSpPr>
         <p:spPr>
           <a:xfrm>
-            <a:off x="236023" y="2981443"/>
+            <a:off x="343856" y="2989158"/>
             <a:ext cx="1567341" cy="822226"/>
           </a:xfrm>
           <a:prstGeom prst="roundRect">
@@ -4472,7 +4477,7 @@
         </p:nvSpPr>
         <p:spPr>
           <a:xfrm>
-            <a:off x="4400184" y="3673366"/>
+            <a:off x="4508017" y="3681081"/>
             <a:ext cx="1194733" cy="1965434"/>
           </a:xfrm>
           <a:prstGeom prst="roundRect">
@@ -4648,7 +4653,7 @@
         </p:nvSpPr>
         <p:spPr>
           <a:xfrm>
-            <a:off x="7972435" y="3639720"/>
+            <a:off x="8080268" y="3647435"/>
             <a:ext cx="1089193" cy="825856"/>
           </a:xfrm>
           <a:prstGeom prst="roundRect">
@@ -4754,7 +4759,7 @@
         </p:nvSpPr>
         <p:spPr>
           <a:xfrm>
-            <a:off x="1942905" y="3665169"/>
+            <a:off x="2050738" y="3672884"/>
             <a:ext cx="216470" cy="138499"/>
           </a:xfrm>
           <a:prstGeom prst="rect">
@@ -4794,7 +4799,7 @@
         </p:nvSpPr>
         <p:spPr>
           <a:xfrm>
-            <a:off x="1969691" y="3688789"/>
+            <a:off x="2077524" y="3696504"/>
             <a:ext cx="213264" cy="138499"/>
           </a:xfrm>
           <a:prstGeom prst="rect">
@@ -4834,7 +4839,7 @@
         </p:nvSpPr>
         <p:spPr>
           <a:xfrm>
-            <a:off x="1731970" y="1849373"/>
+            <a:off x="1839803" y="1857088"/>
             <a:ext cx="238912" cy="138499"/>
           </a:xfrm>
           <a:prstGeom prst="rect">
@@ -4874,7 +4879,7 @@
         </p:nvSpPr>
         <p:spPr>
           <a:xfrm>
-            <a:off x="6808955" y="3461039"/>
+            <a:off x="6916788" y="3468754"/>
             <a:ext cx="336695" cy="138499"/>
           </a:xfrm>
           <a:prstGeom prst="rect">
@@ -4914,7 +4919,7 @@
         </p:nvSpPr>
         <p:spPr>
           <a:xfrm>
-            <a:off x="5637457" y="3561828"/>
+            <a:off x="5745290" y="3569543"/>
             <a:ext cx="242118" cy="138499"/>
           </a:xfrm>
           <a:prstGeom prst="rect">
@@ -4954,7 +4959,7 @@
         </p:nvSpPr>
         <p:spPr>
           <a:xfrm>
-            <a:off x="9381756" y="3050113"/>
+            <a:off x="9489589" y="3057828"/>
             <a:ext cx="235706" cy="138499"/>
           </a:xfrm>
           <a:prstGeom prst="rect">
@@ -4994,7 +4999,7 @@
         </p:nvSpPr>
         <p:spPr>
           <a:xfrm>
-            <a:off x="6163352" y="3949154"/>
+            <a:off x="6271185" y="3956869"/>
             <a:ext cx="198837" cy="138499"/>
           </a:xfrm>
           <a:prstGeom prst="rect">
@@ -5034,7 +5039,7 @@
         </p:nvSpPr>
         <p:spPr>
           <a:xfrm>
-            <a:off x="6882928" y="3673269"/>
+            <a:off x="6990761" y="3680984"/>
             <a:ext cx="270972" cy="138499"/>
           </a:xfrm>
           <a:prstGeom prst="rect">
@@ -5074,7 +5079,7 @@
         </p:nvSpPr>
         <p:spPr>
           <a:xfrm>
-            <a:off x="6036689" y="3377373"/>
+            <a:off x="6144522" y="3385088"/>
             <a:ext cx="232500" cy="138499"/>
           </a:xfrm>
           <a:prstGeom prst="rect">
@@ -5114,7 +5119,7 @@
         </p:nvSpPr>
         <p:spPr>
           <a:xfrm>
-            <a:off x="5372797" y="3208360"/>
+            <a:off x="5480630" y="3216075"/>
             <a:ext cx="211661" cy="138499"/>
           </a:xfrm>
           <a:prstGeom prst="rect">
@@ -5154,7 +5159,7 @@
         </p:nvSpPr>
         <p:spPr>
           <a:xfrm>
-            <a:off x="1397584" y="1849372"/>
+            <a:off x="1505417" y="1857087"/>
             <a:ext cx="245324" cy="138499"/>
           </a:xfrm>
           <a:prstGeom prst="rect">
@@ -5194,7 +5199,7 @@
         </p:nvSpPr>
         <p:spPr>
           <a:xfrm>
-            <a:off x="5668379" y="3003241"/>
+            <a:off x="5776212" y="3010956"/>
             <a:ext cx="133113" cy="138499"/>
           </a:xfrm>
           <a:prstGeom prst="rect">
@@ -5234,7 +5239,7 @@
         </p:nvSpPr>
         <p:spPr>
           <a:xfrm>
-            <a:off x="6688107" y="3266644"/>
+            <a:off x="6795940" y="3274359"/>
             <a:ext cx="280590" cy="138499"/>
           </a:xfrm>
           <a:prstGeom prst="rect">

</xml_diff>